<commit_message>
fix the data explanation
</commit_message>
<xml_diff>
--- a/data_generator/Data_Explanation.pptx
+++ b/data_generator/Data_Explanation.pptx
@@ -264,7 +264,7 @@
           <a:p>
             <a:fld id="{0D0C7CDD-A9FC-4E07-9754-23659D6B9A99}" type="datetimeFigureOut">
               <a:rPr lang="zh-CN" altLang="en-US" smtClean="0"/>
-              <a:t>2019/1/31</a:t>
+              <a:t>2019/2/18</a:t>
             </a:fld>
             <a:endParaRPr lang="zh-CN" altLang="en-US"/>
           </a:p>
@@ -462,7 +462,7 @@
           <a:p>
             <a:fld id="{0D0C7CDD-A9FC-4E07-9754-23659D6B9A99}" type="datetimeFigureOut">
               <a:rPr lang="zh-CN" altLang="en-US" smtClean="0"/>
-              <a:t>2019/1/31</a:t>
+              <a:t>2019/2/18</a:t>
             </a:fld>
             <a:endParaRPr lang="zh-CN" altLang="en-US"/>
           </a:p>
@@ -670,7 +670,7 @@
           <a:p>
             <a:fld id="{0D0C7CDD-A9FC-4E07-9754-23659D6B9A99}" type="datetimeFigureOut">
               <a:rPr lang="zh-CN" altLang="en-US" smtClean="0"/>
-              <a:t>2019/1/31</a:t>
+              <a:t>2019/2/18</a:t>
             </a:fld>
             <a:endParaRPr lang="zh-CN" altLang="en-US"/>
           </a:p>
@@ -868,7 +868,7 @@
           <a:p>
             <a:fld id="{0D0C7CDD-A9FC-4E07-9754-23659D6B9A99}" type="datetimeFigureOut">
               <a:rPr lang="zh-CN" altLang="en-US" smtClean="0"/>
-              <a:t>2019/1/31</a:t>
+              <a:t>2019/2/18</a:t>
             </a:fld>
             <a:endParaRPr lang="zh-CN" altLang="en-US"/>
           </a:p>
@@ -1143,7 +1143,7 @@
           <a:p>
             <a:fld id="{0D0C7CDD-A9FC-4E07-9754-23659D6B9A99}" type="datetimeFigureOut">
               <a:rPr lang="zh-CN" altLang="en-US" smtClean="0"/>
-              <a:t>2019/1/31</a:t>
+              <a:t>2019/2/18</a:t>
             </a:fld>
             <a:endParaRPr lang="zh-CN" altLang="en-US"/>
           </a:p>
@@ -1408,7 +1408,7 @@
           <a:p>
             <a:fld id="{0D0C7CDD-A9FC-4E07-9754-23659D6B9A99}" type="datetimeFigureOut">
               <a:rPr lang="zh-CN" altLang="en-US" smtClean="0"/>
-              <a:t>2019/1/31</a:t>
+              <a:t>2019/2/18</a:t>
             </a:fld>
             <a:endParaRPr lang="zh-CN" altLang="en-US"/>
           </a:p>
@@ -1820,7 +1820,7 @@
           <a:p>
             <a:fld id="{0D0C7CDD-A9FC-4E07-9754-23659D6B9A99}" type="datetimeFigureOut">
               <a:rPr lang="zh-CN" altLang="en-US" smtClean="0"/>
-              <a:t>2019/1/31</a:t>
+              <a:t>2019/2/18</a:t>
             </a:fld>
             <a:endParaRPr lang="zh-CN" altLang="en-US"/>
           </a:p>
@@ -1961,7 +1961,7 @@
           <a:p>
             <a:fld id="{0D0C7CDD-A9FC-4E07-9754-23659D6B9A99}" type="datetimeFigureOut">
               <a:rPr lang="zh-CN" altLang="en-US" smtClean="0"/>
-              <a:t>2019/1/31</a:t>
+              <a:t>2019/2/18</a:t>
             </a:fld>
             <a:endParaRPr lang="zh-CN" altLang="en-US"/>
           </a:p>
@@ -2074,7 +2074,7 @@
           <a:p>
             <a:fld id="{0D0C7CDD-A9FC-4E07-9754-23659D6B9A99}" type="datetimeFigureOut">
               <a:rPr lang="zh-CN" altLang="en-US" smtClean="0"/>
-              <a:t>2019/1/31</a:t>
+              <a:t>2019/2/18</a:t>
             </a:fld>
             <a:endParaRPr lang="zh-CN" altLang="en-US"/>
           </a:p>
@@ -2385,7 +2385,7 @@
           <a:p>
             <a:fld id="{0D0C7CDD-A9FC-4E07-9754-23659D6B9A99}" type="datetimeFigureOut">
               <a:rPr lang="zh-CN" altLang="en-US" smtClean="0"/>
-              <a:t>2019/1/31</a:t>
+              <a:t>2019/2/18</a:t>
             </a:fld>
             <a:endParaRPr lang="zh-CN" altLang="en-US"/>
           </a:p>
@@ -2673,7 +2673,7 @@
           <a:p>
             <a:fld id="{0D0C7CDD-A9FC-4E07-9754-23659D6B9A99}" type="datetimeFigureOut">
               <a:rPr lang="zh-CN" altLang="en-US" smtClean="0"/>
-              <a:t>2019/1/31</a:t>
+              <a:t>2019/2/18</a:t>
             </a:fld>
             <a:endParaRPr lang="zh-CN" altLang="en-US"/>
           </a:p>
@@ -2914,7 +2914,7 @@
           <a:p>
             <a:fld id="{0D0C7CDD-A9FC-4E07-9754-23659D6B9A99}" type="datetimeFigureOut">
               <a:rPr lang="zh-CN" altLang="en-US" smtClean="0"/>
-              <a:t>2019/1/31</a:t>
+              <a:t>2019/2/18</a:t>
             </a:fld>
             <a:endParaRPr lang="zh-CN" altLang="en-US"/>
           </a:p>
@@ -3339,8 +3339,8 @@
         </p:nvSpPr>
         <p:spPr>
           <a:xfrm>
-            <a:off x="2504960" y="1825098"/>
-            <a:ext cx="7182081" cy="1569660"/>
+            <a:off x="1646617" y="1215718"/>
+            <a:ext cx="8898765" cy="2399183"/>
           </a:xfrm>
           <a:prstGeom prst="rect">
             <a:avLst/>
@@ -3359,17 +3359,52 @@
               </a:lnSpc>
             </a:pPr>
             <a:r>
-              <a:rPr lang="en-US" altLang="zh-CN" sz="3200" dirty="0"/>
-              <a:t>Single-cell RNA Similarity Search Tool</a:t>
-            </a:r>
-          </a:p>
-          <a:p>
-            <a:pPr algn="ctr"/>
-            <a:r>
-              <a:rPr lang="en-US" altLang="zh-CN" sz="4800" dirty="0"/>
+              <a:rPr lang="en-US" altLang="zh-CN" sz="3200" dirty="0">
+                <a:latin typeface="Times New Roman" panose="02020603050405020304" pitchFamily="18" charset="0"/>
+                <a:ea typeface="宋体" panose="02010600030101010101" pitchFamily="2" charset="-122"/>
+              </a:rPr>
+              <a:t>Using </a:t>
+            </a:r>
+            <a:r>
+              <a:rPr lang="en-US" altLang="zh-CN" sz="3200" dirty="0" err="1">
+                <a:latin typeface="Times New Roman" panose="02020603050405020304" pitchFamily="18" charset="0"/>
+                <a:ea typeface="宋体" panose="02010600030101010101" pitchFamily="2" charset="-122"/>
+              </a:rPr>
+              <a:t>DenseFly</a:t>
+            </a:r>
+            <a:r>
+              <a:rPr lang="en-US" altLang="zh-CN" sz="3200" dirty="0">
+                <a:latin typeface="Times New Roman" panose="02020603050405020304" pitchFamily="18" charset="0"/>
+                <a:ea typeface="宋体" panose="02010600030101010101" pitchFamily="2" charset="-122"/>
+              </a:rPr>
+              <a:t> algorithm for cell searching on massive </a:t>
+            </a:r>
+            <a:r>
+              <a:rPr lang="en-US" altLang="zh-CN" sz="3200" dirty="0" err="1">
+                <a:latin typeface="Times New Roman" panose="02020603050405020304" pitchFamily="18" charset="0"/>
+                <a:ea typeface="宋体" panose="02010600030101010101" pitchFamily="2" charset="-122"/>
+              </a:rPr>
+              <a:t>scRNA</a:t>
+            </a:r>
+            <a:r>
+              <a:rPr lang="en-US" altLang="zh-CN" sz="3200" dirty="0">
+                <a:latin typeface="Times New Roman" panose="02020603050405020304" pitchFamily="18" charset="0"/>
+                <a:ea typeface="宋体" panose="02010600030101010101" pitchFamily="2" charset="-122"/>
+              </a:rPr>
+              <a:t>-seq datasets</a:t>
+            </a:r>
+          </a:p>
+          <a:p>
+            <a:pPr algn="ctr">
+              <a:lnSpc>
+                <a:spcPct val="150000"/>
+              </a:lnSpc>
+            </a:pPr>
+            <a:r>
+              <a:rPr lang="en-US" altLang="zh-CN" sz="3600" dirty="0"/>
               <a:t>Test Datasets</a:t>
             </a:r>
-            <a:endParaRPr lang="zh-CN" altLang="en-US" sz="4800" dirty="0"/>
+            <a:endParaRPr lang="zh-CN" altLang="en-US" sz="3600" dirty="0"/>
           </a:p>
         </p:txBody>
       </p:sp>
@@ -3381,8 +3416,8 @@
         </p:nvSpPr>
         <p:spPr>
           <a:xfrm>
-            <a:off x="4973053" y="4359751"/>
-            <a:ext cx="2245895" cy="523220"/>
+            <a:off x="1646617" y="4780165"/>
+            <a:ext cx="10394731" cy="369332"/>
           </a:xfrm>
           <a:prstGeom prst="rect">
             <a:avLst/>
@@ -3395,16 +3430,52 @@
           </a:bodyPr>
           <a:lstStyle/>
           <a:p>
-            <a:pPr algn="ctr"/>
-            <a:r>
-              <a:rPr lang="en-US" altLang="zh-CN" sz="2800" dirty="0" err="1"/>
+            <a:pPr hangingPunct="0"/>
+            <a:r>
+              <a:rPr lang="en-US" altLang="zh-CN" dirty="0" err="1"/>
               <a:t>Yixin</a:t>
             </a:r>
             <a:r>
-              <a:rPr lang="en-US" altLang="zh-CN" sz="2800" dirty="0"/>
+              <a:rPr lang="en-US" altLang="zh-CN" dirty="0"/>
               <a:t> Chen</a:t>
             </a:r>
-            <a:endParaRPr lang="zh-CN" altLang="en-US" sz="2800" dirty="0"/>
+            <a:r>
+              <a:rPr lang="en-US" altLang="zh-CN" baseline="30000" dirty="0"/>
+              <a:t> [0000-0002-2946-5122]</a:t>
+            </a:r>
+            <a:r>
+              <a:rPr lang="en-US" altLang="zh-CN" dirty="0"/>
+              <a:t>, </a:t>
+            </a:r>
+            <a:r>
+              <a:rPr lang="en-US" altLang="zh-CN" dirty="0" err="1"/>
+              <a:t>Sijie</a:t>
+            </a:r>
+            <a:r>
+              <a:rPr lang="en-US" altLang="zh-CN" dirty="0"/>
+              <a:t> Chen</a:t>
+            </a:r>
+            <a:r>
+              <a:rPr lang="en-US" altLang="zh-CN" baseline="30000" dirty="0"/>
+              <a:t> [0000-0003-4331-0773]  </a:t>
+            </a:r>
+            <a:r>
+              <a:rPr lang="en-US" altLang="zh-CN" dirty="0"/>
+              <a:t>and </a:t>
+            </a:r>
+            <a:r>
+              <a:rPr lang="en-US" altLang="zh-CN" dirty="0" err="1"/>
+              <a:t>Xuegong</a:t>
+            </a:r>
+            <a:r>
+              <a:rPr lang="en-US" altLang="zh-CN" dirty="0"/>
+              <a:t> Zhang*</a:t>
+            </a:r>
+            <a:r>
+              <a:rPr lang="en-US" altLang="zh-CN" baseline="30000" dirty="0"/>
+              <a:t> [0000-0002-9684-5643]</a:t>
+            </a:r>
+            <a:endParaRPr lang="zh-CN" altLang="zh-CN" dirty="0"/>
           </a:p>
         </p:txBody>
       </p:sp>
@@ -3518,9 +3589,9 @@
         <p:grpSpPr>
           <a:xfrm>
             <a:off x="706315" y="306013"/>
-            <a:ext cx="10779371" cy="3127889"/>
+            <a:ext cx="10779371" cy="2712391"/>
             <a:chOff x="597876" y="395645"/>
-            <a:chExt cx="9143590" cy="3127889"/>
+            <a:chExt cx="9143590" cy="2712391"/>
           </a:xfrm>
         </p:grpSpPr>
         <p:sp>
@@ -3552,8 +3623,11 @@
             <a:lstStyle/>
             <a:p>
               <a:r>
-                <a:rPr lang="en-US" altLang="zh-CN" sz="2400" b="1" dirty="0" err="1"/>
-                <a:t>Toy_Data</a:t>
+                <a:rPr lang="en-US" altLang="zh-CN" sz="2400" b="1" dirty="0">
+                  <a:latin typeface="Times New Roman" panose="02020603050405020304" pitchFamily="18" charset="0"/>
+                  <a:ea typeface="Times New Roman" panose="02020603050405020304" pitchFamily="18" charset="0"/>
+                </a:rPr>
+                <a:t>SIM I</a:t>
               </a:r>
               <a:endParaRPr lang="zh-CN" altLang="en-US" sz="2000" b="1" dirty="0"/>
             </a:p>
@@ -3574,7 +3648,7 @@
           <p:spPr>
             <a:xfrm>
               <a:off x="597876" y="980402"/>
-              <a:ext cx="9143590" cy="2543132"/>
+              <a:ext cx="9143590" cy="2127634"/>
             </a:xfrm>
             <a:prstGeom prst="rect">
               <a:avLst/>
@@ -3586,48 +3660,6 @@
               <a:spAutoFit/>
             </a:bodyPr>
             <a:lstStyle/>
-            <a:p>
-              <a:pPr marL="285750" indent="-285750">
-                <a:lnSpc>
-                  <a:spcPct val="150000"/>
-                </a:lnSpc>
-                <a:buFont typeface="Arial" panose="020B0604020202020204" pitchFamily="34" charset="0"/>
-                <a:buChar char="•"/>
-              </a:pPr>
-              <a:r>
-                <a:rPr lang="en-US" altLang="zh-CN" b="1" dirty="0"/>
-                <a:t>Location: 	</a:t>
-              </a:r>
-              <a:r>
-                <a:rPr lang="en-US" altLang="zh-CN" dirty="0"/>
-                <a:t>stocky:  /home/</a:t>
-              </a:r>
-              <a:r>
-                <a:rPr lang="en-US" altLang="zh-CN" dirty="0" err="1"/>
-                <a:t>chenyx</a:t>
-              </a:r>
-              <a:r>
-                <a:rPr lang="en-US" altLang="zh-CN" dirty="0"/>
-                <a:t>/</a:t>
-              </a:r>
-              <a:r>
-                <a:rPr lang="en-US" altLang="zh-CN" dirty="0" err="1"/>
-                <a:t>LSH_Data</a:t>
-              </a:r>
-              <a:r>
-                <a:rPr lang="en-US" altLang="zh-CN" dirty="0"/>
-                <a:t>/</a:t>
-              </a:r>
-              <a:r>
-                <a:rPr lang="en-US" altLang="zh-CN" dirty="0" err="1"/>
-                <a:t>Toy_Data</a:t>
-              </a:r>
-              <a:r>
-                <a:rPr lang="en-US" altLang="zh-CN" dirty="0"/>
-                <a:t>/Toy_Data.txt</a:t>
-              </a:r>
-              <a:endParaRPr lang="en-US" altLang="zh-CN" b="1" dirty="0"/>
-            </a:p>
             <a:p>
               <a:pPr marL="285750" indent="-285750">
                 <a:lnSpc>
@@ -3901,9 +3933,9 @@
         <p:grpSpPr>
           <a:xfrm>
             <a:off x="706315" y="252745"/>
-            <a:ext cx="10779371" cy="3127889"/>
+            <a:ext cx="10779371" cy="2712391"/>
             <a:chOff x="597876" y="395645"/>
-            <a:chExt cx="9143590" cy="3127889"/>
+            <a:chExt cx="9143590" cy="2712391"/>
           </a:xfrm>
         </p:grpSpPr>
         <p:sp>
@@ -3935,8 +3967,11 @@
             <a:lstStyle/>
             <a:p>
               <a:r>
-                <a:rPr lang="en-US" altLang="zh-CN" sz="2400" b="1" dirty="0" err="1"/>
-                <a:t>Batch_Data</a:t>
+                <a:rPr lang="en-US" altLang="zh-CN" sz="2400" b="1" dirty="0">
+                  <a:latin typeface="Times New Roman" panose="02020603050405020304" pitchFamily="18" charset="0"/>
+                  <a:ea typeface="Times New Roman" panose="02020603050405020304" pitchFamily="18" charset="0"/>
+                </a:rPr>
+                <a:t>SIM II</a:t>
               </a:r>
               <a:endParaRPr lang="zh-CN" altLang="en-US" sz="2000" b="1" dirty="0"/>
             </a:p>
@@ -3957,7 +3992,7 @@
           <p:spPr>
             <a:xfrm>
               <a:off x="597876" y="980402"/>
-              <a:ext cx="9143590" cy="2543132"/>
+              <a:ext cx="9143590" cy="2127634"/>
             </a:xfrm>
             <a:prstGeom prst="rect">
               <a:avLst/>
@@ -3969,48 +4004,6 @@
               <a:spAutoFit/>
             </a:bodyPr>
             <a:lstStyle/>
-            <a:p>
-              <a:pPr marL="285750" indent="-285750">
-                <a:lnSpc>
-                  <a:spcPct val="150000"/>
-                </a:lnSpc>
-                <a:buFont typeface="Arial" panose="020B0604020202020204" pitchFamily="34" charset="0"/>
-                <a:buChar char="•"/>
-              </a:pPr>
-              <a:r>
-                <a:rPr lang="en-US" altLang="zh-CN" b="1" dirty="0"/>
-                <a:t>Location: 	</a:t>
-              </a:r>
-              <a:r>
-                <a:rPr lang="en-US" altLang="zh-CN" dirty="0"/>
-                <a:t>stocky:  /home/</a:t>
-              </a:r>
-              <a:r>
-                <a:rPr lang="en-US" altLang="zh-CN" dirty="0" err="1"/>
-                <a:t>chenyx</a:t>
-              </a:r>
-              <a:r>
-                <a:rPr lang="en-US" altLang="zh-CN" dirty="0"/>
-                <a:t>/</a:t>
-              </a:r>
-              <a:r>
-                <a:rPr lang="en-US" altLang="zh-CN" dirty="0" err="1"/>
-                <a:t>LSH_Data</a:t>
-              </a:r>
-              <a:r>
-                <a:rPr lang="en-US" altLang="zh-CN" dirty="0"/>
-                <a:t>/</a:t>
-              </a:r>
-              <a:r>
-                <a:rPr lang="en-US" altLang="zh-CN" dirty="0" err="1"/>
-                <a:t>Batch_Data</a:t>
-              </a:r>
-              <a:r>
-                <a:rPr lang="en-US" altLang="zh-CN" dirty="0"/>
-                <a:t>/Batch_Data.txt</a:t>
-              </a:r>
-              <a:endParaRPr lang="en-US" altLang="zh-CN" b="1" dirty="0"/>
-            </a:p>
             <a:p>
               <a:pPr marL="285750" indent="-285750">
                 <a:lnSpc>
@@ -4099,7 +4092,7 @@
               </a:r>
               <a:r>
                 <a:rPr lang="en-US" altLang="zh-CN" dirty="0"/>
-                <a:t>to study the robust of batch effect</a:t>
+                <a:t>to study the resistance to batch effect</a:t>
               </a:r>
             </a:p>
           </p:txBody>
@@ -4284,9 +4277,9 @@
         <p:grpSpPr>
           <a:xfrm>
             <a:off x="706315" y="306013"/>
-            <a:ext cx="10779371" cy="3127889"/>
+            <a:ext cx="10779371" cy="2712391"/>
             <a:chOff x="597876" y="395645"/>
-            <a:chExt cx="9143590" cy="3127889"/>
+            <a:chExt cx="9143590" cy="2712391"/>
           </a:xfrm>
         </p:grpSpPr>
         <p:sp>
@@ -4318,8 +4311,11 @@
             <a:lstStyle/>
             <a:p>
               <a:r>
-                <a:rPr lang="en-US" altLang="zh-CN" sz="2400" b="1" dirty="0" err="1"/>
-                <a:t>Dropout_Data</a:t>
+                <a:rPr lang="en-US" altLang="zh-CN" sz="2400" b="1" dirty="0">
+                  <a:latin typeface="Times New Roman" panose="02020603050405020304" pitchFamily="18" charset="0"/>
+                  <a:ea typeface="Times New Roman" panose="02020603050405020304" pitchFamily="18" charset="0"/>
+                </a:rPr>
+                <a:t>SIM III</a:t>
               </a:r>
               <a:endParaRPr lang="zh-CN" altLang="en-US" sz="2000" b="1" dirty="0"/>
             </a:p>
@@ -4340,7 +4336,7 @@
           <p:spPr>
             <a:xfrm>
               <a:off x="597876" y="980402"/>
-              <a:ext cx="9143590" cy="2543132"/>
+              <a:ext cx="9143590" cy="2127634"/>
             </a:xfrm>
             <a:prstGeom prst="rect">
               <a:avLst/>
@@ -4352,48 +4348,6 @@
               <a:spAutoFit/>
             </a:bodyPr>
             <a:lstStyle/>
-            <a:p>
-              <a:pPr marL="285750" indent="-285750">
-                <a:lnSpc>
-                  <a:spcPct val="150000"/>
-                </a:lnSpc>
-                <a:buFont typeface="Arial" panose="020B0604020202020204" pitchFamily="34" charset="0"/>
-                <a:buChar char="•"/>
-              </a:pPr>
-              <a:r>
-                <a:rPr lang="en-US" altLang="zh-CN" b="1" dirty="0"/>
-                <a:t>Location: 	</a:t>
-              </a:r>
-              <a:r>
-                <a:rPr lang="en-US" altLang="zh-CN" dirty="0"/>
-                <a:t>stocky:  /home/</a:t>
-              </a:r>
-              <a:r>
-                <a:rPr lang="en-US" altLang="zh-CN" dirty="0" err="1"/>
-                <a:t>chenyx</a:t>
-              </a:r>
-              <a:r>
-                <a:rPr lang="en-US" altLang="zh-CN" dirty="0"/>
-                <a:t>/</a:t>
-              </a:r>
-              <a:r>
-                <a:rPr lang="en-US" altLang="zh-CN" dirty="0" err="1"/>
-                <a:t>LSH_Data</a:t>
-              </a:r>
-              <a:r>
-                <a:rPr lang="en-US" altLang="zh-CN" dirty="0"/>
-                <a:t>/</a:t>
-              </a:r>
-              <a:r>
-                <a:rPr lang="en-US" altLang="zh-CN" dirty="0" err="1"/>
-                <a:t>Dropout_X_Data</a:t>
-              </a:r>
-              <a:r>
-                <a:rPr lang="en-US" altLang="zh-CN" dirty="0"/>
-                <a:t>/Dropout_X_Data.txt</a:t>
-              </a:r>
-              <a:endParaRPr lang="en-US" altLang="zh-CN" b="1" dirty="0"/>
-            </a:p>
             <a:p>
               <a:pPr marL="285750" indent="-285750">
                 <a:lnSpc>
@@ -4481,7 +4435,7 @@
               </a:r>
               <a:r>
                 <a:rPr lang="en-US" altLang="zh-CN" dirty="0"/>
-                <a:t> to study the robust of dropout</a:t>
+                <a:t> to study the resistance to dropout</a:t>
               </a:r>
             </a:p>
           </p:txBody>

</xml_diff>